<commit_message>
after OR department seminar - a new version
</commit_message>
<xml_diff>
--- a/Presentation.pptx
+++ b/Presentation.pptx
@@ -191,6 +191,9 @@
         </p15:guide>
       </p15:sldGuideLst>
     </p:ext>
+    <p:ext uri="{2D200454-40CA-4A62-9FC3-DE9A4176ACB9}">
+      <p15:notesGuideLst xmlns:p15="http://schemas.microsoft.com/office/powerpoint/2012/main"/>
+    </p:ext>
   </p:extLst>
 </p:presentation>
 </file>
@@ -277,7 +280,7 @@
           <a:p>
             <a:fld id="{E7782445-AB6A-463D-8ED1-DAC420135245}" type="datetimeFigureOut">
               <a:rPr lang="en-US" smtClean="0"/>
-              <a:t>9/28/2015</a:t>
+              <a:t>3/22/2017</a:t>
             </a:fld>
             <a:endParaRPr lang="en-US"/>
           </a:p>
@@ -1185,7 +1188,7 @@
           <a:p>
             <a:fld id="{299498B5-242E-4F22-B93F-64BE7E48E668}" type="datetime1">
               <a:rPr lang="en-US" smtClean="0"/>
-              <a:t>9/28/2015</a:t>
+              <a:t>3/22/2017</a:t>
             </a:fld>
             <a:endParaRPr lang="en-US"/>
           </a:p>
@@ -1411,7 +1414,7 @@
           <a:p>
             <a:fld id="{1B961FE6-D118-49E7-AA61-E1019D31ADA9}" type="datetime1">
               <a:rPr lang="en-US" smtClean="0"/>
-              <a:t>9/28/2015</a:t>
+              <a:t>3/22/2017</a:t>
             </a:fld>
             <a:endParaRPr lang="en-US"/>
           </a:p>
@@ -1637,7 +1640,7 @@
           <a:p>
             <a:fld id="{838503E4-C7D9-4354-93F0-A49D3D06C21A}" type="datetime1">
               <a:rPr lang="en-US" smtClean="0"/>
-              <a:t>9/28/2015</a:t>
+              <a:t>3/22/2017</a:t>
             </a:fld>
             <a:endParaRPr lang="en-US"/>
           </a:p>
@@ -1944,7 +1947,7 @@
           <a:p>
             <a:fld id="{C886DE9E-B1EE-4024-9975-8BD2E74E1CC1}" type="datetime1">
               <a:rPr lang="en-US" smtClean="0"/>
-              <a:t>9/28/2015</a:t>
+              <a:t>3/22/2017</a:t>
             </a:fld>
             <a:endParaRPr lang="en-US"/>
           </a:p>
@@ -2278,7 +2281,7 @@
           <a:p>
             <a:fld id="{60EBAB6D-496E-47A5-AAD3-D6CCE863AEF8}" type="datetime1">
               <a:rPr lang="en-US" smtClean="0"/>
-              <a:t>9/28/2015</a:t>
+              <a:t>3/22/2017</a:t>
             </a:fld>
             <a:endParaRPr lang="en-US"/>
           </a:p>
@@ -2746,7 +2749,7 @@
           <a:p>
             <a:fld id="{359961EE-8F57-4851-8896-702C0FCA0048}" type="datetime1">
               <a:rPr lang="en-US" smtClean="0"/>
-              <a:t>9/28/2015</a:t>
+              <a:t>3/22/2017</a:t>
             </a:fld>
             <a:endParaRPr lang="en-US"/>
           </a:p>
@@ -2910,7 +2913,7 @@
           <a:p>
             <a:fld id="{A34FF0D9-8144-4957-B694-CC9068A18F3D}" type="datetime1">
               <a:rPr lang="en-US" smtClean="0"/>
-              <a:t>9/28/2015</a:t>
+              <a:t>3/22/2017</a:t>
             </a:fld>
             <a:endParaRPr lang="en-US"/>
           </a:p>
@@ -3051,7 +3054,7 @@
           <a:p>
             <a:fld id="{A8E7934E-DC1A-475D-ACD0-10FAFC934232}" type="datetime1">
               <a:rPr lang="en-US" smtClean="0"/>
-              <a:t>9/28/2015</a:t>
+              <a:t>3/22/2017</a:t>
             </a:fld>
             <a:endParaRPr lang="en-US"/>
           </a:p>
@@ -3374,7 +3377,7 @@
           <a:p>
             <a:fld id="{60AC0255-E048-46C5-BA98-9D75A6657119}" type="datetime1">
               <a:rPr lang="en-US" smtClean="0"/>
-              <a:t>9/28/2015</a:t>
+              <a:t>3/22/2017</a:t>
             </a:fld>
             <a:endParaRPr lang="en-US"/>
           </a:p>
@@ -3673,7 +3676,7 @@
           <a:p>
             <a:fld id="{7A27F88B-01B6-4D7C-8F08-11CE667BCB82}" type="datetime1">
               <a:rPr lang="en-US" smtClean="0"/>
-              <a:t>9/28/2015</a:t>
+              <a:t>3/22/2017</a:t>
             </a:fld>
             <a:endParaRPr lang="en-US"/>
           </a:p>
@@ -3902,7 +3905,7 @@
           <a:p>
             <a:fld id="{79036EC6-D5EE-4835-84AE-AED1FC3FA655}" type="datetime1">
               <a:rPr lang="en-US" smtClean="0"/>
-              <a:t>9/28/2015</a:t>
+              <a:t>3/22/2017</a:t>
             </a:fld>
             <a:endParaRPr lang="en-US"/>
           </a:p>

</xml_diff>